<commit_message>
updated syllabus and slides
</commit_message>
<xml_diff>
--- a/Slides/02_EDUC_6050_2018.pptx
+++ b/Slides/02_EDUC_6050_2018.pptx
@@ -1,6 +1,6 @@
 
 <file path=ppt/presentation.xml><?xml version="1.0" encoding="utf-8"?>
-<p:presentation xmlns:a="http://schemas.openxmlformats.org/drawingml/2006/main" xmlns:r="http://schemas.openxmlformats.org/officeDocument/2006/relationships" xmlns:p="http://schemas.openxmlformats.org/presentationml/2006/main" saveSubsetFonts="1" autoCompressPictures="0">
+<p:presentation xmlns:a="http://schemas.openxmlformats.org/drawingml/2006/main" xmlns:r="http://schemas.openxmlformats.org/officeDocument/2006/relationships" xmlns:p="http://schemas.openxmlformats.org/presentationml/2006/main" showSpecialPlsOnTitleSld="0" saveSubsetFonts="1" autoCompressPictures="0">
   <p:sldMasterIdLst>
     <p:sldMasterId id="2147483648" r:id="rId1"/>
   </p:sldMasterIdLst>
@@ -228,7 +228,7 @@
           <a:p>
             <a:fld id="{E2EB8C27-4EA0-7247-87A3-872976A07B51}" type="datetimeFigureOut">
               <a:rPr lang="en-US" smtClean="0"/>
-              <a:t>1/5/18</a:t>
+              <a:t>1/8/18</a:t>
             </a:fld>
             <a:endParaRPr lang="en-US"/>
           </a:p>
@@ -2279,9 +2279,9 @@
           <a:bodyPr/>
           <a:lstStyle/>
           <a:p>
-            <a:fld id="{6B54304B-BE7E-0B46-811C-93731445F83C}" type="datetimeFigureOut">
+            <a:fld id="{7F3B1BD2-AC91-014A-B76B-DDFF35BEA2F5}" type="datetime1">
               <a:rPr lang="en-US" smtClean="0"/>
-              <a:t>1/5/18</a:t>
+              <a:t>1/8/18</a:t>
             </a:fld>
             <a:endParaRPr lang="en-US"/>
           </a:p>
@@ -2449,9 +2449,9 @@
           <a:bodyPr/>
           <a:lstStyle/>
           <a:p>
-            <a:fld id="{6B54304B-BE7E-0B46-811C-93731445F83C}" type="datetimeFigureOut">
+            <a:fld id="{0AFA0ACC-2E59-0847-A07B-C25F513D5FE4}" type="datetime1">
               <a:rPr lang="en-US" smtClean="0"/>
-              <a:t>1/5/18</a:t>
+              <a:t>1/8/18</a:t>
             </a:fld>
             <a:endParaRPr lang="en-US"/>
           </a:p>
@@ -2629,9 +2629,9 @@
           <a:bodyPr/>
           <a:lstStyle/>
           <a:p>
-            <a:fld id="{6B54304B-BE7E-0B46-811C-93731445F83C}" type="datetimeFigureOut">
+            <a:fld id="{E323CD64-7C00-674E-9B78-8C8E4E5EB807}" type="datetime1">
               <a:rPr lang="en-US" smtClean="0"/>
-              <a:t>1/5/18</a:t>
+              <a:t>1/8/18</a:t>
             </a:fld>
             <a:endParaRPr lang="en-US"/>
           </a:p>
@@ -2799,9 +2799,9 @@
           <a:bodyPr/>
           <a:lstStyle/>
           <a:p>
-            <a:fld id="{6B54304B-BE7E-0B46-811C-93731445F83C}" type="datetimeFigureOut">
+            <a:fld id="{DC846460-0452-CC43-92FD-E4A2F42651F3}" type="datetime1">
               <a:rPr lang="en-US" smtClean="0"/>
-              <a:t>1/5/18</a:t>
+              <a:t>1/8/18</a:t>
             </a:fld>
             <a:endParaRPr lang="en-US"/>
           </a:p>
@@ -3045,9 +3045,9 @@
           <a:bodyPr/>
           <a:lstStyle/>
           <a:p>
-            <a:fld id="{6B54304B-BE7E-0B46-811C-93731445F83C}" type="datetimeFigureOut">
+            <a:fld id="{4F8B428D-E107-B04F-AA78-14E261719592}" type="datetime1">
               <a:rPr lang="en-US" smtClean="0"/>
-              <a:t>1/5/18</a:t>
+              <a:t>1/8/18</a:t>
             </a:fld>
             <a:endParaRPr lang="en-US"/>
           </a:p>
@@ -3277,9 +3277,9 @@
           <a:bodyPr/>
           <a:lstStyle/>
           <a:p>
-            <a:fld id="{6B54304B-BE7E-0B46-811C-93731445F83C}" type="datetimeFigureOut">
+            <a:fld id="{B39964FB-0EF9-7648-AB41-C2206787D0A8}" type="datetime1">
               <a:rPr lang="en-US" smtClean="0"/>
-              <a:t>1/5/18</a:t>
+              <a:t>1/8/18</a:t>
             </a:fld>
             <a:endParaRPr lang="en-US"/>
           </a:p>
@@ -3644,9 +3644,9 @@
           <a:bodyPr/>
           <a:lstStyle/>
           <a:p>
-            <a:fld id="{6B54304B-BE7E-0B46-811C-93731445F83C}" type="datetimeFigureOut">
+            <a:fld id="{FE040194-FD4D-EA40-BCE5-9341587863FA}" type="datetime1">
               <a:rPr lang="en-US" smtClean="0"/>
-              <a:t>1/5/18</a:t>
+              <a:t>1/8/18</a:t>
             </a:fld>
             <a:endParaRPr lang="en-US"/>
           </a:p>
@@ -3762,9 +3762,9 @@
           <a:bodyPr/>
           <a:lstStyle/>
           <a:p>
-            <a:fld id="{6B54304B-BE7E-0B46-811C-93731445F83C}" type="datetimeFigureOut">
+            <a:fld id="{1DAC5FA7-813C-794F-AF2A-637D648B10D6}" type="datetime1">
               <a:rPr lang="en-US" smtClean="0"/>
-              <a:t>1/5/18</a:t>
+              <a:t>1/8/18</a:t>
             </a:fld>
             <a:endParaRPr lang="en-US"/>
           </a:p>
@@ -3857,9 +3857,9 @@
           <a:bodyPr/>
           <a:lstStyle/>
           <a:p>
-            <a:fld id="{6B54304B-BE7E-0B46-811C-93731445F83C}" type="datetimeFigureOut">
+            <a:fld id="{030DA565-14DC-FC44-AEFA-A86B130DDB8E}" type="datetime1">
               <a:rPr lang="en-US" smtClean="0"/>
-              <a:t>1/5/18</a:t>
+              <a:t>1/8/18</a:t>
             </a:fld>
             <a:endParaRPr lang="en-US"/>
           </a:p>
@@ -4134,9 +4134,9 @@
           <a:bodyPr/>
           <a:lstStyle/>
           <a:p>
-            <a:fld id="{6B54304B-BE7E-0B46-811C-93731445F83C}" type="datetimeFigureOut">
+            <a:fld id="{29D6CD53-D3D9-A542-BE51-C1DDA69747BB}" type="datetime1">
               <a:rPr lang="en-US" smtClean="0"/>
-              <a:t>1/5/18</a:t>
+              <a:t>1/8/18</a:t>
             </a:fld>
             <a:endParaRPr lang="en-US"/>
           </a:p>
@@ -4387,9 +4387,9 @@
           <a:bodyPr/>
           <a:lstStyle/>
           <a:p>
-            <a:fld id="{6B54304B-BE7E-0B46-811C-93731445F83C}" type="datetimeFigureOut">
+            <a:fld id="{7DF876AC-35E1-D344-88D6-A85DF9D3AB9F}" type="datetime1">
               <a:rPr lang="en-US" smtClean="0"/>
-              <a:t>1/5/18</a:t>
+              <a:t>1/8/18</a:t>
             </a:fld>
             <a:endParaRPr lang="en-US"/>
           </a:p>
@@ -4600,9 +4600,9 @@
             </a:lvl1pPr>
           </a:lstStyle>
           <a:p>
-            <a:fld id="{6B54304B-BE7E-0B46-811C-93731445F83C}" type="datetimeFigureOut">
+            <a:fld id="{3EAF7E26-FB91-DB47-AE4F-39BFF9A8E89F}" type="datetime1">
               <a:rPr lang="en-US" smtClean="0"/>
-              <a:t>1/5/18</a:t>
+              <a:t>1/8/18</a:t>
             </a:fld>
             <a:endParaRPr lang="en-US"/>
           </a:p>
@@ -4707,6 +4707,7 @@
     <p:sldLayoutId id="2147483658" r:id="rId10"/>
     <p:sldLayoutId id="2147483659" r:id="rId11"/>
   </p:sldLayoutIdLst>
+  <p:hf hdr="0" ftr="0" dt="0"/>
   <p:txStyles>
     <p:titleStyle>
       <a:lvl1pPr algn="l" defTabSz="914400" rtl="0" eaLnBrk="1" latinLnBrk="0" hangingPunct="1">
@@ -5523,6 +5524,29 @@
           </a:p>
         </p:txBody>
       </p:sp>
+      <p:sp>
+        <p:nvSpPr>
+          <p:cNvPr id="5" name="Slide Number Placeholder 4"/>
+          <p:cNvSpPr>
+            <a:spLocks noGrp="1"/>
+          </p:cNvSpPr>
+          <p:nvPr>
+            <p:ph type="sldNum" sz="quarter" idx="12"/>
+          </p:nvPr>
+        </p:nvSpPr>
+        <p:spPr/>
+        <p:txBody>
+          <a:bodyPr/>
+          <a:lstStyle/>
+          <a:p>
+            <a:fld id="{4655F2EB-082D-1A4D-B2FA-EA5F6FE60629}" type="slidenum">
+              <a:rPr lang="en-US" smtClean="0"/>
+              <a:t>10</a:t>
+            </a:fld>
+            <a:endParaRPr lang="en-US"/>
+          </a:p>
+        </p:txBody>
+      </p:sp>
     </p:spTree>
     <p:extLst>
       <p:ext uri="{BB962C8B-B14F-4D97-AF65-F5344CB8AC3E}">
@@ -5752,6 +5776,29 @@
           </a:p>
         </p:txBody>
       </p:sp>
+      <p:sp>
+        <p:nvSpPr>
+          <p:cNvPr id="3" name="Slide Number Placeholder 2"/>
+          <p:cNvSpPr>
+            <a:spLocks noGrp="1"/>
+          </p:cNvSpPr>
+          <p:nvPr>
+            <p:ph type="sldNum" sz="quarter" idx="12"/>
+          </p:nvPr>
+        </p:nvSpPr>
+        <p:spPr/>
+        <p:txBody>
+          <a:bodyPr/>
+          <a:lstStyle/>
+          <a:p>
+            <a:fld id="{4655F2EB-082D-1A4D-B2FA-EA5F6FE60629}" type="slidenum">
+              <a:rPr lang="en-US" smtClean="0"/>
+              <a:t>11</a:t>
+            </a:fld>
+            <a:endParaRPr lang="en-US"/>
+          </a:p>
+        </p:txBody>
+      </p:sp>
     </p:spTree>
     <p:extLst>
       <p:ext uri="{BB962C8B-B14F-4D97-AF65-F5344CB8AC3E}">
@@ -6048,6 +6095,29 @@
           </a:p>
         </p:txBody>
       </p:sp>
+      <p:sp>
+        <p:nvSpPr>
+          <p:cNvPr id="3" name="Slide Number Placeholder 2"/>
+          <p:cNvSpPr>
+            <a:spLocks noGrp="1"/>
+          </p:cNvSpPr>
+          <p:nvPr>
+            <p:ph type="sldNum" sz="quarter" idx="12"/>
+          </p:nvPr>
+        </p:nvSpPr>
+        <p:spPr/>
+        <p:txBody>
+          <a:bodyPr/>
+          <a:lstStyle/>
+          <a:p>
+            <a:fld id="{4655F2EB-082D-1A4D-B2FA-EA5F6FE60629}" type="slidenum">
+              <a:rPr lang="en-US" smtClean="0"/>
+              <a:t>12</a:t>
+            </a:fld>
+            <a:endParaRPr lang="en-US"/>
+          </a:p>
+        </p:txBody>
+      </p:sp>
     </p:spTree>
     <p:extLst>
       <p:ext uri="{BB962C8B-B14F-4D97-AF65-F5344CB8AC3E}">
@@ -6130,6 +6200,29 @@
           </a:p>
         </p:txBody>
       </p:sp>
+      <p:sp>
+        <p:nvSpPr>
+          <p:cNvPr id="2" name="Slide Number Placeholder 1"/>
+          <p:cNvSpPr>
+            <a:spLocks noGrp="1"/>
+          </p:cNvSpPr>
+          <p:nvPr>
+            <p:ph type="sldNum" sz="quarter" idx="12"/>
+          </p:nvPr>
+        </p:nvSpPr>
+        <p:spPr/>
+        <p:txBody>
+          <a:bodyPr/>
+          <a:lstStyle/>
+          <a:p>
+            <a:fld id="{4655F2EB-082D-1A4D-B2FA-EA5F6FE60629}" type="slidenum">
+              <a:rPr lang="en-US" smtClean="0"/>
+              <a:t>13</a:t>
+            </a:fld>
+            <a:endParaRPr lang="en-US"/>
+          </a:p>
+        </p:txBody>
+      </p:sp>
     </p:spTree>
     <p:extLst>
       <p:ext uri="{BB962C8B-B14F-4D97-AF65-F5344CB8AC3E}">
@@ -6432,6 +6525,29 @@
           </a:p>
         </p:txBody>
       </p:sp>
+      <p:sp>
+        <p:nvSpPr>
+          <p:cNvPr id="3" name="Slide Number Placeholder 2"/>
+          <p:cNvSpPr>
+            <a:spLocks noGrp="1"/>
+          </p:cNvSpPr>
+          <p:nvPr>
+            <p:ph type="sldNum" sz="quarter" idx="12"/>
+          </p:nvPr>
+        </p:nvSpPr>
+        <p:spPr/>
+        <p:txBody>
+          <a:bodyPr/>
+          <a:lstStyle/>
+          <a:p>
+            <a:fld id="{4655F2EB-082D-1A4D-B2FA-EA5F6FE60629}" type="slidenum">
+              <a:rPr lang="en-US" smtClean="0"/>
+              <a:t>14</a:t>
+            </a:fld>
+            <a:endParaRPr lang="en-US"/>
+          </a:p>
+        </p:txBody>
+      </p:sp>
     </p:spTree>
     <p:extLst>
       <p:ext uri="{BB962C8B-B14F-4D97-AF65-F5344CB8AC3E}">
@@ -6695,6 +6811,29 @@
               </a:rPr>
               <a:t>4. Have a high degree of information</a:t>
             </a:r>
+          </a:p>
+        </p:txBody>
+      </p:sp>
+      <p:sp>
+        <p:nvSpPr>
+          <p:cNvPr id="3" name="Slide Number Placeholder 2"/>
+          <p:cNvSpPr>
+            <a:spLocks noGrp="1"/>
+          </p:cNvSpPr>
+          <p:nvPr>
+            <p:ph type="sldNum" sz="quarter" idx="12"/>
+          </p:nvPr>
+        </p:nvSpPr>
+        <p:spPr/>
+        <p:txBody>
+          <a:bodyPr/>
+          <a:lstStyle/>
+          <a:p>
+            <a:fld id="{4655F2EB-082D-1A4D-B2FA-EA5F6FE60629}" type="slidenum">
+              <a:rPr lang="en-US" smtClean="0"/>
+              <a:t>15</a:t>
+            </a:fld>
+            <a:endParaRPr lang="en-US"/>
           </a:p>
         </p:txBody>
       </p:sp>
@@ -7273,6 +7412,29 @@
           </a:graphicData>
         </a:graphic>
       </p:graphicFrame>
+      <p:sp>
+        <p:nvSpPr>
+          <p:cNvPr id="5" name="Slide Number Placeholder 4"/>
+          <p:cNvSpPr>
+            <a:spLocks noGrp="1"/>
+          </p:cNvSpPr>
+          <p:nvPr>
+            <p:ph type="sldNum" sz="quarter" idx="12"/>
+          </p:nvPr>
+        </p:nvSpPr>
+        <p:spPr/>
+        <p:txBody>
+          <a:bodyPr/>
+          <a:lstStyle/>
+          <a:p>
+            <a:fld id="{4655F2EB-082D-1A4D-B2FA-EA5F6FE60629}" type="slidenum">
+              <a:rPr lang="en-US" smtClean="0"/>
+              <a:t>16</a:t>
+            </a:fld>
+            <a:endParaRPr lang="en-US"/>
+          </a:p>
+        </p:txBody>
+      </p:sp>
     </p:spTree>
     <p:extLst>
       <p:ext uri="{BB962C8B-B14F-4D97-AF65-F5344CB8AC3E}">
@@ -7783,6 +7945,29 @@
           </a:graphicData>
         </a:graphic>
       </p:graphicFrame>
+      <p:sp>
+        <p:nvSpPr>
+          <p:cNvPr id="5" name="Slide Number Placeholder 4"/>
+          <p:cNvSpPr>
+            <a:spLocks noGrp="1"/>
+          </p:cNvSpPr>
+          <p:nvPr>
+            <p:ph type="sldNum" sz="quarter" idx="12"/>
+          </p:nvPr>
+        </p:nvSpPr>
+        <p:spPr/>
+        <p:txBody>
+          <a:bodyPr/>
+          <a:lstStyle/>
+          <a:p>
+            <a:fld id="{4655F2EB-082D-1A4D-B2FA-EA5F6FE60629}" type="slidenum">
+              <a:rPr lang="en-US" smtClean="0"/>
+              <a:t>17</a:t>
+            </a:fld>
+            <a:endParaRPr lang="en-US"/>
+          </a:p>
+        </p:txBody>
+      </p:sp>
     </p:spTree>
     <p:extLst>
       <p:ext uri="{BB962C8B-B14F-4D97-AF65-F5344CB8AC3E}">
@@ -8476,6 +8661,29 @@
           </a:fontRef>
         </p:style>
       </p:cxnSp>
+      <p:sp>
+        <p:nvSpPr>
+          <p:cNvPr id="6" name="Slide Number Placeholder 5"/>
+          <p:cNvSpPr>
+            <a:spLocks noGrp="1"/>
+          </p:cNvSpPr>
+          <p:nvPr>
+            <p:ph type="sldNum" sz="quarter" idx="12"/>
+          </p:nvPr>
+        </p:nvSpPr>
+        <p:spPr/>
+        <p:txBody>
+          <a:bodyPr/>
+          <a:lstStyle/>
+          <a:p>
+            <a:fld id="{4655F2EB-082D-1A4D-B2FA-EA5F6FE60629}" type="slidenum">
+              <a:rPr lang="en-US" smtClean="0"/>
+              <a:t>18</a:t>
+            </a:fld>
+            <a:endParaRPr lang="en-US"/>
+          </a:p>
+        </p:txBody>
+      </p:sp>
     </p:spTree>
     <p:extLst>
       <p:ext uri="{BB962C8B-B14F-4D97-AF65-F5344CB8AC3E}">
@@ -9078,6 +9286,29 @@
           </a:p>
         </p:txBody>
       </p:sp>
+      <p:sp>
+        <p:nvSpPr>
+          <p:cNvPr id="6" name="Slide Number Placeholder 5"/>
+          <p:cNvSpPr>
+            <a:spLocks noGrp="1"/>
+          </p:cNvSpPr>
+          <p:nvPr>
+            <p:ph type="sldNum" sz="quarter" idx="12"/>
+          </p:nvPr>
+        </p:nvSpPr>
+        <p:spPr/>
+        <p:txBody>
+          <a:bodyPr/>
+          <a:lstStyle/>
+          <a:p>
+            <a:fld id="{4655F2EB-082D-1A4D-B2FA-EA5F6FE60629}" type="slidenum">
+              <a:rPr lang="en-US" smtClean="0"/>
+              <a:t>19</a:t>
+            </a:fld>
+            <a:endParaRPr lang="en-US"/>
+          </a:p>
+        </p:txBody>
+      </p:sp>
     </p:spTree>
     <p:extLst>
       <p:ext uri="{BB962C8B-B14F-4D97-AF65-F5344CB8AC3E}">
@@ -9288,6 +9519,29 @@
           </a:p>
         </p:txBody>
       </p:sp>
+      <p:sp>
+        <p:nvSpPr>
+          <p:cNvPr id="3" name="Slide Number Placeholder 2"/>
+          <p:cNvSpPr>
+            <a:spLocks noGrp="1"/>
+          </p:cNvSpPr>
+          <p:nvPr>
+            <p:ph type="sldNum" sz="quarter" idx="12"/>
+          </p:nvPr>
+        </p:nvSpPr>
+        <p:spPr/>
+        <p:txBody>
+          <a:bodyPr/>
+          <a:lstStyle/>
+          <a:p>
+            <a:fld id="{4655F2EB-082D-1A4D-B2FA-EA5F6FE60629}" type="slidenum">
+              <a:rPr lang="en-US" smtClean="0"/>
+              <a:t>2</a:t>
+            </a:fld>
+            <a:endParaRPr lang="en-US"/>
+          </a:p>
+        </p:txBody>
+      </p:sp>
     </p:spTree>
     <p:extLst>
       <p:ext uri="{BB962C8B-B14F-4D97-AF65-F5344CB8AC3E}">
@@ -9610,6 +9864,29 @@
           </a:p>
         </p:txBody>
       </p:sp>
+      <p:sp>
+        <p:nvSpPr>
+          <p:cNvPr id="3" name="Slide Number Placeholder 2"/>
+          <p:cNvSpPr>
+            <a:spLocks noGrp="1"/>
+          </p:cNvSpPr>
+          <p:nvPr>
+            <p:ph type="sldNum" sz="quarter" idx="12"/>
+          </p:nvPr>
+        </p:nvSpPr>
+        <p:spPr/>
+        <p:txBody>
+          <a:bodyPr/>
+          <a:lstStyle/>
+          <a:p>
+            <a:fld id="{4655F2EB-082D-1A4D-B2FA-EA5F6FE60629}" type="slidenum">
+              <a:rPr lang="en-US" smtClean="0"/>
+              <a:t>20</a:t>
+            </a:fld>
+            <a:endParaRPr lang="en-US"/>
+          </a:p>
+        </p:txBody>
+      </p:sp>
     </p:spTree>
     <p:extLst>
       <p:ext uri="{BB962C8B-B14F-4D97-AF65-F5344CB8AC3E}">
@@ -9963,6 +10240,29 @@
           </a:fontRef>
         </p:style>
       </p:cxnSp>
+      <p:sp>
+        <p:nvSpPr>
+          <p:cNvPr id="3" name="Slide Number Placeholder 2"/>
+          <p:cNvSpPr>
+            <a:spLocks noGrp="1"/>
+          </p:cNvSpPr>
+          <p:nvPr>
+            <p:ph type="sldNum" sz="quarter" idx="12"/>
+          </p:nvPr>
+        </p:nvSpPr>
+        <p:spPr/>
+        <p:txBody>
+          <a:bodyPr/>
+          <a:lstStyle/>
+          <a:p>
+            <a:fld id="{4655F2EB-082D-1A4D-B2FA-EA5F6FE60629}" type="slidenum">
+              <a:rPr lang="en-US" smtClean="0"/>
+              <a:t>21</a:t>
+            </a:fld>
+            <a:endParaRPr lang="en-US"/>
+          </a:p>
+        </p:txBody>
+      </p:sp>
     </p:spTree>
     <p:extLst>
       <p:ext uri="{BB962C8B-B14F-4D97-AF65-F5344CB8AC3E}">
@@ -10045,6 +10345,29 @@
           </a:p>
         </p:txBody>
       </p:sp>
+      <p:sp>
+        <p:nvSpPr>
+          <p:cNvPr id="2" name="Slide Number Placeholder 1"/>
+          <p:cNvSpPr>
+            <a:spLocks noGrp="1"/>
+          </p:cNvSpPr>
+          <p:nvPr>
+            <p:ph type="sldNum" sz="quarter" idx="12"/>
+          </p:nvPr>
+        </p:nvSpPr>
+        <p:spPr/>
+        <p:txBody>
+          <a:bodyPr/>
+          <a:lstStyle/>
+          <a:p>
+            <a:fld id="{4655F2EB-082D-1A4D-B2FA-EA5F6FE60629}" type="slidenum">
+              <a:rPr lang="en-US" smtClean="0"/>
+              <a:t>22</a:t>
+            </a:fld>
+            <a:endParaRPr lang="en-US"/>
+          </a:p>
+        </p:txBody>
+      </p:sp>
     </p:spTree>
     <p:extLst>
       <p:ext uri="{BB962C8B-B14F-4D97-AF65-F5344CB8AC3E}">
@@ -10144,29 +10467,7 @@
                 <a:ea typeface="Consolas" charset="0"/>
                 <a:cs typeface="Consolas" charset="0"/>
               </a:rPr>
-              <a:t>A VERY </a:t>
-            </a:r>
-            <a:r>
-              <a:rPr lang="en-US" sz="3600" b="1" dirty="0" smtClean="0">
-                <a:solidFill>
-                  <a:schemeClr val="accent3"/>
-                </a:solidFill>
-                <a:latin typeface="Consolas" charset="0"/>
-                <a:ea typeface="Consolas" charset="0"/>
-                <a:cs typeface="Consolas" charset="0"/>
-              </a:rPr>
-              <a:t>IMPORTANT part </a:t>
-            </a:r>
-            <a:r>
-              <a:rPr lang="en-US" sz="3600" b="1" dirty="0" smtClean="0">
-                <a:solidFill>
-                  <a:schemeClr val="accent3"/>
-                </a:solidFill>
-                <a:latin typeface="Consolas" charset="0"/>
-                <a:ea typeface="Consolas" charset="0"/>
-                <a:cs typeface="Consolas" charset="0"/>
-              </a:rPr>
-              <a:t>of data analysis</a:t>
+              <a:t>A VERY IMPORTANT part of data analysis</a:t>
             </a:r>
           </a:p>
         </p:txBody>
@@ -10269,14 +10570,6 @@
               </a:rPr>
               <a:t>results in a much more meaningful way</a:t>
             </a:r>
-            <a:endParaRPr lang="en-US" sz="3600" b="1" dirty="0" smtClean="0">
-              <a:solidFill>
-                <a:schemeClr val="tx2"/>
-              </a:solidFill>
-              <a:latin typeface="Consolas" charset="0"/>
-              <a:ea typeface="Consolas" charset="0"/>
-              <a:cs typeface="Consolas" charset="0"/>
-            </a:endParaRPr>
           </a:p>
         </p:txBody>
       </p:sp>
@@ -10313,14 +10606,29 @@
               </a:rPr>
               <a:t>Takes some practice</a:t>
             </a:r>
-            <a:endParaRPr lang="en-US" sz="3600" b="1" dirty="0" smtClean="0">
-              <a:solidFill>
-                <a:schemeClr val="accent4"/>
-              </a:solidFill>
-              <a:latin typeface="Consolas" charset="0"/>
-              <a:ea typeface="Consolas" charset="0"/>
-              <a:cs typeface="Consolas" charset="0"/>
-            </a:endParaRPr>
+          </a:p>
+        </p:txBody>
+      </p:sp>
+      <p:sp>
+        <p:nvSpPr>
+          <p:cNvPr id="3" name="Slide Number Placeholder 2"/>
+          <p:cNvSpPr>
+            <a:spLocks noGrp="1"/>
+          </p:cNvSpPr>
+          <p:nvPr>
+            <p:ph type="sldNum" sz="quarter" idx="12"/>
+          </p:nvPr>
+        </p:nvSpPr>
+        <p:spPr/>
+        <p:txBody>
+          <a:bodyPr/>
+          <a:lstStyle/>
+          <a:p>
+            <a:fld id="{4655F2EB-082D-1A4D-B2FA-EA5F6FE60629}" type="slidenum">
+              <a:rPr lang="en-US" smtClean="0"/>
+              <a:t>23</a:t>
+            </a:fld>
+            <a:endParaRPr lang="en-US"/>
           </a:p>
         </p:txBody>
       </p:sp>
@@ -10382,23 +10690,7 @@
                 <a:ea typeface="Consolas" charset="0"/>
                 <a:cs typeface="Consolas" charset="0"/>
               </a:rPr>
-              <a:t>Some Types </a:t>
-            </a:r>
-            <a:r>
-              <a:rPr lang="en-US" b="1" dirty="0" smtClean="0">
-                <a:latin typeface="Consolas" charset="0"/>
-                <a:ea typeface="Consolas" charset="0"/>
-                <a:cs typeface="Consolas" charset="0"/>
-              </a:rPr>
-              <a:t>of </a:t>
-            </a:r>
-            <a:r>
-              <a:rPr lang="en-US" b="1" dirty="0" smtClean="0">
-                <a:latin typeface="Consolas" charset="0"/>
-                <a:ea typeface="Consolas" charset="0"/>
-                <a:cs typeface="Consolas" charset="0"/>
-              </a:rPr>
-              <a:t>Data Graphics</a:t>
+              <a:t>Some Types of Data Graphics</a:t>
             </a:r>
             <a:endParaRPr lang="en-US" b="1" dirty="0">
               <a:latin typeface="Consolas" charset="0"/>
@@ -10528,6 +10820,29 @@
               </a:rPr>
               <a:t>Boxplots</a:t>
             </a:r>
+          </a:p>
+        </p:txBody>
+      </p:sp>
+      <p:sp>
+        <p:nvSpPr>
+          <p:cNvPr id="3" name="Slide Number Placeholder 2"/>
+          <p:cNvSpPr>
+            <a:spLocks noGrp="1"/>
+          </p:cNvSpPr>
+          <p:nvPr>
+            <p:ph type="sldNum" sz="quarter" idx="12"/>
+          </p:nvPr>
+        </p:nvSpPr>
+        <p:spPr/>
+        <p:txBody>
+          <a:bodyPr/>
+          <a:lstStyle/>
+          <a:p>
+            <a:fld id="{4655F2EB-082D-1A4D-B2FA-EA5F6FE60629}" type="slidenum">
+              <a:rPr lang="en-US" smtClean="0"/>
+              <a:t>24</a:t>
+            </a:fld>
+            <a:endParaRPr lang="en-US"/>
           </a:p>
         </p:txBody>
       </p:sp>
@@ -10632,14 +10947,6 @@
               </a:rPr>
               <a:t>Generally shows trends and patterns across groups</a:t>
             </a:r>
-            <a:endParaRPr lang="en-US" sz="3600" b="1" dirty="0" smtClean="0">
-              <a:solidFill>
-                <a:schemeClr val="accent6"/>
-              </a:solidFill>
-              <a:latin typeface="Consolas" charset="0"/>
-              <a:ea typeface="Consolas" charset="0"/>
-              <a:cs typeface="Consolas" charset="0"/>
-            </a:endParaRPr>
           </a:p>
         </p:txBody>
       </p:sp>
@@ -10667,6 +10974,29 @@
           </a:prstGeom>
         </p:spPr>
       </p:pic>
+      <p:sp>
+        <p:nvSpPr>
+          <p:cNvPr id="4" name="Slide Number Placeholder 3"/>
+          <p:cNvSpPr>
+            <a:spLocks noGrp="1"/>
+          </p:cNvSpPr>
+          <p:nvPr>
+            <p:ph type="sldNum" sz="quarter" idx="12"/>
+          </p:nvPr>
+        </p:nvSpPr>
+        <p:spPr/>
+        <p:txBody>
+          <a:bodyPr/>
+          <a:lstStyle/>
+          <a:p>
+            <a:fld id="{4655F2EB-082D-1A4D-B2FA-EA5F6FE60629}" type="slidenum">
+              <a:rPr lang="en-US" smtClean="0"/>
+              <a:t>25</a:t>
+            </a:fld>
+            <a:endParaRPr lang="en-US"/>
+          </a:p>
+        </p:txBody>
+      </p:sp>
     </p:spTree>
     <p:extLst>
       <p:ext uri="{BB962C8B-B14F-4D97-AF65-F5344CB8AC3E}">
@@ -10764,14 +11094,6 @@
               </a:rPr>
               <a:t>and </a:t>
             </a:r>
-            <a:r>
-              <a:rPr lang="en-US" b="1" smtClean="0">
-                <a:latin typeface="Consolas" charset="0"/>
-                <a:ea typeface="Consolas" charset="0"/>
-                <a:cs typeface="Consolas" charset="0"/>
-              </a:rPr>
-              <a:t/>
-            </a:r>
             <a:br>
               <a:rPr lang="en-US" b="1" smtClean="0">
                 <a:latin typeface="Consolas" charset="0"/>
@@ -10828,14 +11150,29 @@
               </a:rPr>
               <a:t>These help us understand distributions and frequencies</a:t>
             </a:r>
-            <a:endParaRPr lang="en-US" sz="3600" b="1" dirty="0" smtClean="0">
-              <a:solidFill>
-                <a:schemeClr val="accent6"/>
-              </a:solidFill>
-              <a:latin typeface="Consolas" charset="0"/>
-              <a:ea typeface="Consolas" charset="0"/>
-              <a:cs typeface="Consolas" charset="0"/>
-            </a:endParaRPr>
+          </a:p>
+        </p:txBody>
+      </p:sp>
+      <p:sp>
+        <p:nvSpPr>
+          <p:cNvPr id="4" name="Slide Number Placeholder 3"/>
+          <p:cNvSpPr>
+            <a:spLocks noGrp="1"/>
+          </p:cNvSpPr>
+          <p:nvPr>
+            <p:ph type="sldNum" sz="quarter" idx="12"/>
+          </p:nvPr>
+        </p:nvSpPr>
+        <p:spPr/>
+        <p:txBody>
+          <a:bodyPr/>
+          <a:lstStyle/>
+          <a:p>
+            <a:fld id="{4655F2EB-082D-1A4D-B2FA-EA5F6FE60629}" type="slidenum">
+              <a:rPr lang="en-US" smtClean="0"/>
+              <a:t>26</a:t>
+            </a:fld>
+            <a:endParaRPr lang="en-US"/>
           </a:p>
         </p:txBody>
       </p:sp>
@@ -10974,14 +11311,6 @@
               </a:rPr>
               <a:t>Short-tailed vs. long-tailed</a:t>
             </a:r>
-            <a:endParaRPr lang="en-US" sz="3600" b="1" dirty="0" smtClean="0">
-              <a:solidFill>
-                <a:schemeClr val="accent5"/>
-              </a:solidFill>
-              <a:latin typeface="Consolas" charset="0"/>
-              <a:ea typeface="Consolas" charset="0"/>
-              <a:cs typeface="Consolas" charset="0"/>
-            </a:endParaRPr>
           </a:p>
         </p:txBody>
       </p:sp>
@@ -11020,14 +11349,6 @@
                 <a:cs typeface="Consolas" charset="0"/>
               </a:rPr>
               <a:t>and </a:t>
-            </a:r>
-            <a:r>
-              <a:rPr lang="en-US" b="1" smtClean="0">
-                <a:latin typeface="Consolas" charset="0"/>
-                <a:ea typeface="Consolas" charset="0"/>
-                <a:cs typeface="Consolas" charset="0"/>
-              </a:rPr>
-              <a:t/>
             </a:r>
             <a:br>
               <a:rPr lang="en-US" b="1" smtClean="0">
@@ -11107,14 +11428,29 @@
               </a:rPr>
               <a:t> and frequencies</a:t>
             </a:r>
-            <a:endParaRPr lang="en-US" sz="3600" b="1" dirty="0" smtClean="0">
-              <a:solidFill>
-                <a:schemeClr val="accent6"/>
-              </a:solidFill>
-              <a:latin typeface="Consolas" charset="0"/>
-              <a:ea typeface="Consolas" charset="0"/>
-              <a:cs typeface="Consolas" charset="0"/>
-            </a:endParaRPr>
+          </a:p>
+        </p:txBody>
+      </p:sp>
+      <p:sp>
+        <p:nvSpPr>
+          <p:cNvPr id="2" name="Slide Number Placeholder 1"/>
+          <p:cNvSpPr>
+            <a:spLocks noGrp="1"/>
+          </p:cNvSpPr>
+          <p:nvPr>
+            <p:ph type="sldNum" sz="quarter" idx="12"/>
+          </p:nvPr>
+        </p:nvSpPr>
+        <p:spPr/>
+        <p:txBody>
+          <a:bodyPr/>
+          <a:lstStyle/>
+          <a:p>
+            <a:fld id="{4655F2EB-082D-1A4D-B2FA-EA5F6FE60629}" type="slidenum">
+              <a:rPr lang="en-US" smtClean="0"/>
+              <a:t>27</a:t>
+            </a:fld>
+            <a:endParaRPr lang="en-US"/>
           </a:p>
         </p:txBody>
       </p:sp>
@@ -11265,6 +11601,29 @@
           </a:prstGeom>
         </p:spPr>
       </p:pic>
+      <p:sp>
+        <p:nvSpPr>
+          <p:cNvPr id="4" name="Slide Number Placeholder 3"/>
+          <p:cNvSpPr>
+            <a:spLocks noGrp="1"/>
+          </p:cNvSpPr>
+          <p:nvPr>
+            <p:ph type="sldNum" sz="quarter" idx="12"/>
+          </p:nvPr>
+        </p:nvSpPr>
+        <p:spPr/>
+        <p:txBody>
+          <a:bodyPr/>
+          <a:lstStyle/>
+          <a:p>
+            <a:fld id="{4655F2EB-082D-1A4D-B2FA-EA5F6FE60629}" type="slidenum">
+              <a:rPr lang="en-US" smtClean="0"/>
+              <a:t>28</a:t>
+            </a:fld>
+            <a:endParaRPr lang="en-US"/>
+          </a:p>
+        </p:txBody>
+      </p:sp>
     </p:spTree>
     <p:extLst>
       <p:ext uri="{BB962C8B-B14F-4D97-AF65-F5344CB8AC3E}">
@@ -11389,14 +11748,29 @@
               </a:rPr>
               <a:t>Show us the range and where most values are for a variable (usually across groups)</a:t>
             </a:r>
-            <a:endParaRPr lang="en-US" sz="3600" b="1" dirty="0" smtClean="0">
-              <a:solidFill>
-                <a:schemeClr val="accent6"/>
-              </a:solidFill>
-              <a:latin typeface="Consolas" charset="0"/>
-              <a:ea typeface="Consolas" charset="0"/>
-              <a:cs typeface="Consolas" charset="0"/>
-            </a:endParaRPr>
+          </a:p>
+        </p:txBody>
+      </p:sp>
+      <p:sp>
+        <p:nvSpPr>
+          <p:cNvPr id="4" name="Slide Number Placeholder 3"/>
+          <p:cNvSpPr>
+            <a:spLocks noGrp="1"/>
+          </p:cNvSpPr>
+          <p:nvPr>
+            <p:ph type="sldNum" sz="quarter" idx="12"/>
+          </p:nvPr>
+        </p:nvSpPr>
+        <p:spPr/>
+        <p:txBody>
+          <a:bodyPr/>
+          <a:lstStyle/>
+          <a:p>
+            <a:fld id="{4655F2EB-082D-1A4D-B2FA-EA5F6FE60629}" type="slidenum">
+              <a:rPr lang="en-US" smtClean="0"/>
+              <a:t>29</a:t>
+            </a:fld>
+            <a:endParaRPr lang="en-US"/>
           </a:p>
         </p:txBody>
       </p:sp>
@@ -11513,6 +11887,29 @@
           </a:p>
         </p:txBody>
       </p:sp>
+      <p:sp>
+        <p:nvSpPr>
+          <p:cNvPr id="4" name="Slide Number Placeholder 3"/>
+          <p:cNvSpPr>
+            <a:spLocks noGrp="1"/>
+          </p:cNvSpPr>
+          <p:nvPr>
+            <p:ph type="sldNum" sz="quarter" idx="12"/>
+          </p:nvPr>
+        </p:nvSpPr>
+        <p:spPr/>
+        <p:txBody>
+          <a:bodyPr/>
+          <a:lstStyle/>
+          <a:p>
+            <a:fld id="{4655F2EB-082D-1A4D-B2FA-EA5F6FE60629}" type="slidenum">
+              <a:rPr lang="en-US" smtClean="0"/>
+              <a:t>3</a:t>
+            </a:fld>
+            <a:endParaRPr lang="en-US"/>
+          </a:p>
+        </p:txBody>
+      </p:sp>
     </p:spTree>
     <p:extLst>
       <p:ext uri="{BB962C8B-B14F-4D97-AF65-F5344CB8AC3E}">
@@ -11614,14 +12011,6 @@
               </a:rPr>
               <a:t>Tables can also be very valuable to understand patterns in the data</a:t>
             </a:r>
-            <a:endParaRPr lang="en-US" sz="3600" b="1" dirty="0" smtClean="0">
-              <a:solidFill>
-                <a:schemeClr val="accent6"/>
-              </a:solidFill>
-              <a:latin typeface="Consolas" charset="0"/>
-              <a:ea typeface="Consolas" charset="0"/>
-              <a:cs typeface="Consolas" charset="0"/>
-            </a:endParaRPr>
           </a:p>
         </p:txBody>
       </p:sp>
@@ -12109,6 +12498,29 @@
           </a:graphicData>
         </a:graphic>
       </p:graphicFrame>
+      <p:sp>
+        <p:nvSpPr>
+          <p:cNvPr id="4" name="Slide Number Placeholder 3"/>
+          <p:cNvSpPr>
+            <a:spLocks noGrp="1"/>
+          </p:cNvSpPr>
+          <p:nvPr>
+            <p:ph type="sldNum" sz="quarter" idx="12"/>
+          </p:nvPr>
+        </p:nvSpPr>
+        <p:spPr/>
+        <p:txBody>
+          <a:bodyPr/>
+          <a:lstStyle/>
+          <a:p>
+            <a:fld id="{4655F2EB-082D-1A4D-B2FA-EA5F6FE60629}" type="slidenum">
+              <a:rPr lang="en-US" smtClean="0"/>
+              <a:t>30</a:t>
+            </a:fld>
+            <a:endParaRPr lang="en-US"/>
+          </a:p>
+        </p:txBody>
+      </p:sp>
     </p:spTree>
     <p:extLst>
       <p:ext uri="{BB962C8B-B14F-4D97-AF65-F5344CB8AC3E}">
@@ -12187,6 +12599,29 @@
           </a:p>
         </p:txBody>
       </p:sp>
+      <p:sp>
+        <p:nvSpPr>
+          <p:cNvPr id="2" name="Slide Number Placeholder 1"/>
+          <p:cNvSpPr>
+            <a:spLocks noGrp="1"/>
+          </p:cNvSpPr>
+          <p:nvPr>
+            <p:ph type="sldNum" sz="quarter" idx="12"/>
+          </p:nvPr>
+        </p:nvSpPr>
+        <p:spPr/>
+        <p:txBody>
+          <a:bodyPr/>
+          <a:lstStyle/>
+          <a:p>
+            <a:fld id="{4655F2EB-082D-1A4D-B2FA-EA5F6FE60629}" type="slidenum">
+              <a:rPr lang="en-US" smtClean="0"/>
+              <a:t>31</a:t>
+            </a:fld>
+            <a:endParaRPr lang="en-US"/>
+          </a:p>
+        </p:txBody>
+      </p:sp>
     </p:spTree>
     <p:extLst>
       <p:ext uri="{BB962C8B-B14F-4D97-AF65-F5344CB8AC3E}">
@@ -12364,6 +12799,29 @@
           </a:p>
         </p:txBody>
       </p:sp>
+      <p:sp>
+        <p:nvSpPr>
+          <p:cNvPr id="2" name="Slide Number Placeholder 1"/>
+          <p:cNvSpPr>
+            <a:spLocks noGrp="1"/>
+          </p:cNvSpPr>
+          <p:nvPr>
+            <p:ph type="sldNum" sz="quarter" idx="12"/>
+          </p:nvPr>
+        </p:nvSpPr>
+        <p:spPr/>
+        <p:txBody>
+          <a:bodyPr/>
+          <a:lstStyle/>
+          <a:p>
+            <a:fld id="{4655F2EB-082D-1A4D-B2FA-EA5F6FE60629}" type="slidenum">
+              <a:rPr lang="en-US" smtClean="0"/>
+              <a:t>32</a:t>
+            </a:fld>
+            <a:endParaRPr lang="en-US"/>
+          </a:p>
+        </p:txBody>
+      </p:sp>
     </p:spTree>
     <p:extLst>
       <p:ext uri="{BB962C8B-B14F-4D97-AF65-F5344CB8AC3E}">
@@ -12708,6 +13166,29 @@
           </a:p>
         </p:txBody>
       </p:sp>
+      <p:sp>
+        <p:nvSpPr>
+          <p:cNvPr id="4" name="Slide Number Placeholder 3"/>
+          <p:cNvSpPr>
+            <a:spLocks noGrp="1"/>
+          </p:cNvSpPr>
+          <p:nvPr>
+            <p:ph type="sldNum" sz="quarter" idx="12"/>
+          </p:nvPr>
+        </p:nvSpPr>
+        <p:spPr/>
+        <p:txBody>
+          <a:bodyPr/>
+          <a:lstStyle/>
+          <a:p>
+            <a:fld id="{4655F2EB-082D-1A4D-B2FA-EA5F6FE60629}" type="slidenum">
+              <a:rPr lang="en-US" smtClean="0"/>
+              <a:t>4</a:t>
+            </a:fld>
+            <a:endParaRPr lang="en-US"/>
+          </a:p>
+        </p:txBody>
+      </p:sp>
     </p:spTree>
     <p:extLst>
       <p:ext uri="{BB962C8B-B14F-4D97-AF65-F5344CB8AC3E}">
@@ -12865,6 +13346,29 @@
               <a:ea typeface="Consolas" charset="0"/>
               <a:cs typeface="Consolas" charset="0"/>
             </a:endParaRPr>
+          </a:p>
+        </p:txBody>
+      </p:sp>
+      <p:sp>
+        <p:nvSpPr>
+          <p:cNvPr id="4" name="Slide Number Placeholder 3"/>
+          <p:cNvSpPr>
+            <a:spLocks noGrp="1"/>
+          </p:cNvSpPr>
+          <p:nvPr>
+            <p:ph type="sldNum" sz="quarter" idx="12"/>
+          </p:nvPr>
+        </p:nvSpPr>
+        <p:spPr/>
+        <p:txBody>
+          <a:bodyPr/>
+          <a:lstStyle/>
+          <a:p>
+            <a:fld id="{4655F2EB-082D-1A4D-B2FA-EA5F6FE60629}" type="slidenum">
+              <a:rPr lang="en-US" smtClean="0"/>
+              <a:t>5</a:t>
+            </a:fld>
+            <a:endParaRPr lang="en-US"/>
           </a:p>
         </p:txBody>
       </p:sp>
@@ -13222,6 +13726,29 @@
               <a:ea typeface="Consolas" charset="0"/>
               <a:cs typeface="Consolas" charset="0"/>
             </a:endParaRPr>
+          </a:p>
+        </p:txBody>
+      </p:sp>
+      <p:sp>
+        <p:nvSpPr>
+          <p:cNvPr id="4" name="Slide Number Placeholder 3"/>
+          <p:cNvSpPr>
+            <a:spLocks noGrp="1"/>
+          </p:cNvSpPr>
+          <p:nvPr>
+            <p:ph type="sldNum" sz="quarter" idx="12"/>
+          </p:nvPr>
+        </p:nvSpPr>
+        <p:spPr/>
+        <p:txBody>
+          <a:bodyPr/>
+          <a:lstStyle/>
+          <a:p>
+            <a:fld id="{4655F2EB-082D-1A4D-B2FA-EA5F6FE60629}" type="slidenum">
+              <a:rPr lang="en-US" smtClean="0"/>
+              <a:t>6</a:t>
+            </a:fld>
+            <a:endParaRPr lang="en-US"/>
           </a:p>
         </p:txBody>
       </p:sp>
@@ -13519,6 +14046,29 @@
           </a:p>
         </p:txBody>
       </p:sp>
+      <p:sp>
+        <p:nvSpPr>
+          <p:cNvPr id="3" name="Slide Number Placeholder 2"/>
+          <p:cNvSpPr>
+            <a:spLocks noGrp="1"/>
+          </p:cNvSpPr>
+          <p:nvPr>
+            <p:ph type="sldNum" sz="quarter" idx="12"/>
+          </p:nvPr>
+        </p:nvSpPr>
+        <p:spPr/>
+        <p:txBody>
+          <a:bodyPr/>
+          <a:lstStyle/>
+          <a:p>
+            <a:fld id="{4655F2EB-082D-1A4D-B2FA-EA5F6FE60629}" type="slidenum">
+              <a:rPr lang="en-US" smtClean="0"/>
+              <a:t>7</a:t>
+            </a:fld>
+            <a:endParaRPr lang="en-US"/>
+          </a:p>
+        </p:txBody>
+      </p:sp>
     </p:spTree>
     <p:extLst>
       <p:ext uri="{BB962C8B-B14F-4D97-AF65-F5344CB8AC3E}">
@@ -13768,6 +14318,29 @@
           </a:p>
         </p:txBody>
       </p:sp>
+      <p:sp>
+        <p:nvSpPr>
+          <p:cNvPr id="5" name="Slide Number Placeholder 4"/>
+          <p:cNvSpPr>
+            <a:spLocks noGrp="1"/>
+          </p:cNvSpPr>
+          <p:nvPr>
+            <p:ph type="sldNum" sz="quarter" idx="12"/>
+          </p:nvPr>
+        </p:nvSpPr>
+        <p:spPr/>
+        <p:txBody>
+          <a:bodyPr/>
+          <a:lstStyle/>
+          <a:p>
+            <a:fld id="{4655F2EB-082D-1A4D-B2FA-EA5F6FE60629}" type="slidenum">
+              <a:rPr lang="en-US" smtClean="0"/>
+              <a:t>8</a:t>
+            </a:fld>
+            <a:endParaRPr lang="en-US"/>
+          </a:p>
+        </p:txBody>
+      </p:sp>
     </p:spTree>
     <p:extLst>
       <p:ext uri="{BB962C8B-B14F-4D97-AF65-F5344CB8AC3E}">
@@ -14000,6 +14573,29 @@
               <a:ea typeface="Consolas" charset="0"/>
               <a:cs typeface="Consolas" charset="0"/>
             </a:endParaRPr>
+          </a:p>
+        </p:txBody>
+      </p:sp>
+      <p:sp>
+        <p:nvSpPr>
+          <p:cNvPr id="7" name="Slide Number Placeholder 6"/>
+          <p:cNvSpPr>
+            <a:spLocks noGrp="1"/>
+          </p:cNvSpPr>
+          <p:nvPr>
+            <p:ph type="sldNum" sz="quarter" idx="12"/>
+          </p:nvPr>
+        </p:nvSpPr>
+        <p:spPr/>
+        <p:txBody>
+          <a:bodyPr/>
+          <a:lstStyle/>
+          <a:p>
+            <a:fld id="{4655F2EB-082D-1A4D-B2FA-EA5F6FE60629}" type="slidenum">
+              <a:rPr lang="en-US" smtClean="0"/>
+              <a:t>9</a:t>
+            </a:fld>
+            <a:endParaRPr lang="en-US"/>
           </a:p>
         </p:txBody>
       </p:sp>

</xml_diff>